<commit_message>
Updated Database Indexes Made Simple Presentation
</commit_message>
<xml_diff>
--- a/src/Database Indexes Made Simple/Presentation - Advanced.pptx
+++ b/src/Database Indexes Made Simple/Presentation - Advanced.pptx
@@ -210,7 +210,7 @@
           <a:p>
             <a:fld id="{0F9C471C-5CEB-41C5-B26F-30EBC0FE28CB}" type="datetimeFigureOut">
               <a:rPr lang="en-US" smtClean="0"/>
-              <a:t>8/27/2020</a:t>
+              <a:t>8/31/2020</a:t>
             </a:fld>
             <a:endParaRPr lang="en-US"/>
           </a:p>
@@ -662,7 +662,7 @@
           <a:noFill/>
           <a:extLst>
             <a:ext uri="{909E8E84-426E-40dd-AFC4-6F175D3DCCD1}">
-              <a14:hiddenFill xmlns:a14="http://schemas.microsoft.com/office/drawing/2010/main" xmlns="">
+              <a14:hiddenFill xmlns="" xmlns:a14="http://schemas.microsoft.com/office/drawing/2010/main">
                 <a:solidFill>
                   <a:srgbClr val="FFFFFF"/>
                 </a:solidFill>
@@ -722,7 +722,7 @@
             </a:ln>
             <a:extLst>
               <a:ext uri="{91240B29-F687-4f45-9708-019B960494DF}">
-                <a14:hiddenLine xmlns:a14="http://schemas.microsoft.com/office/drawing/2010/main" xmlns="" w="9525">
+                <a14:hiddenLine xmlns="" xmlns:a14="http://schemas.microsoft.com/office/drawing/2010/main" w="9525">
                   <a:solidFill>
                     <a:srgbClr val="000000"/>
                   </a:solidFill>
@@ -812,7 +812,7 @@
             </a:ln>
             <a:extLst>
               <a:ext uri="{91240B29-F687-4f45-9708-019B960494DF}">
-                <a14:hiddenLine xmlns:a14="http://schemas.microsoft.com/office/drawing/2010/main" xmlns="" w="9525">
+                <a14:hiddenLine xmlns="" xmlns:a14="http://schemas.microsoft.com/office/drawing/2010/main" w="9525">
                   <a:solidFill>
                     <a:srgbClr val="000000"/>
                   </a:solidFill>
@@ -902,7 +902,7 @@
             </a:ln>
             <a:extLst>
               <a:ext uri="{91240B29-F687-4f45-9708-019B960494DF}">
-                <a14:hiddenLine xmlns:a14="http://schemas.microsoft.com/office/drawing/2010/main" xmlns="" w="9525">
+                <a14:hiddenLine xmlns="" xmlns:a14="http://schemas.microsoft.com/office/drawing/2010/main" w="9525">
                   <a:solidFill>
                     <a:srgbClr val="000000"/>
                   </a:solidFill>
@@ -936,7 +936,7 @@
             </a:ln>
             <a:extLst>
               <a:ext uri="{91240B29-F687-4f45-9708-019B960494DF}">
-                <a14:hiddenLine xmlns:a14="http://schemas.microsoft.com/office/drawing/2010/main" xmlns="" w="9525">
+                <a14:hiddenLine xmlns="" xmlns:a14="http://schemas.microsoft.com/office/drawing/2010/main" w="9525">
                   <a:solidFill>
                     <a:srgbClr val="000000"/>
                   </a:solidFill>
@@ -1026,7 +1026,7 @@
             </a:ln>
             <a:extLst>
               <a:ext uri="{91240B29-F687-4f45-9708-019B960494DF}">
-                <a14:hiddenLine xmlns:a14="http://schemas.microsoft.com/office/drawing/2010/main" xmlns="" w="9525">
+                <a14:hiddenLine xmlns="" xmlns:a14="http://schemas.microsoft.com/office/drawing/2010/main" w="9525">
                   <a:solidFill>
                     <a:srgbClr val="000000"/>
                   </a:solidFill>
@@ -1088,7 +1088,7 @@
             </a:ln>
             <a:extLst>
               <a:ext uri="{91240B29-F687-4f45-9708-019B960494DF}">
-                <a14:hiddenLine xmlns:a14="http://schemas.microsoft.com/office/drawing/2010/main" xmlns="" w="9525">
+                <a14:hiddenLine xmlns="" xmlns:a14="http://schemas.microsoft.com/office/drawing/2010/main" w="9525">
                   <a:solidFill>
                     <a:srgbClr val="000000"/>
                   </a:solidFill>
@@ -1150,7 +1150,7 @@
             </a:ln>
             <a:extLst>
               <a:ext uri="{91240B29-F687-4f45-9708-019B960494DF}">
-                <a14:hiddenLine xmlns:a14="http://schemas.microsoft.com/office/drawing/2010/main" xmlns="" w="9525">
+                <a14:hiddenLine xmlns="" xmlns:a14="http://schemas.microsoft.com/office/drawing/2010/main" w="9525">
                   <a:solidFill>
                     <a:srgbClr val="000000"/>
                   </a:solidFill>
@@ -1240,7 +1240,7 @@
             </a:ln>
             <a:extLst>
               <a:ext uri="{91240B29-F687-4f45-9708-019B960494DF}">
-                <a14:hiddenLine xmlns:a14="http://schemas.microsoft.com/office/drawing/2010/main" xmlns="" w="9525">
+                <a14:hiddenLine xmlns="" xmlns:a14="http://schemas.microsoft.com/office/drawing/2010/main" w="9525">
                   <a:solidFill>
                     <a:srgbClr val="000000"/>
                   </a:solidFill>
@@ -1302,7 +1302,7 @@
             </a:ln>
             <a:extLst>
               <a:ext uri="{91240B29-F687-4f45-9708-019B960494DF}">
-                <a14:hiddenLine xmlns:a14="http://schemas.microsoft.com/office/drawing/2010/main" xmlns="" w="9525">
+                <a14:hiddenLine xmlns="" xmlns:a14="http://schemas.microsoft.com/office/drawing/2010/main" w="9525">
                   <a:solidFill>
                     <a:srgbClr val="000000"/>
                   </a:solidFill>
@@ -1364,7 +1364,7 @@
             </a:ln>
             <a:extLst>
               <a:ext uri="{91240B29-F687-4f45-9708-019B960494DF}">
-                <a14:hiddenLine xmlns:a14="http://schemas.microsoft.com/office/drawing/2010/main" xmlns="" w="9525">
+                <a14:hiddenLine xmlns="" xmlns:a14="http://schemas.microsoft.com/office/drawing/2010/main" w="9525">
                   <a:solidFill>
                     <a:srgbClr val="000000"/>
                   </a:solidFill>
@@ -1454,7 +1454,7 @@
             </a:ln>
             <a:extLst>
               <a:ext uri="{91240B29-F687-4f45-9708-019B960494DF}">
-                <a14:hiddenLine xmlns:a14="http://schemas.microsoft.com/office/drawing/2010/main" xmlns="" w="9525">
+                <a14:hiddenLine xmlns="" xmlns:a14="http://schemas.microsoft.com/office/drawing/2010/main" w="9525">
                   <a:solidFill>
                     <a:srgbClr val="000000"/>
                   </a:solidFill>
@@ -1544,7 +1544,7 @@
             </a:ln>
             <a:extLst>
               <a:ext uri="{91240B29-F687-4f45-9708-019B960494DF}">
-                <a14:hiddenLine xmlns:a14="http://schemas.microsoft.com/office/drawing/2010/main" xmlns="" w="9525">
+                <a14:hiddenLine xmlns="" xmlns:a14="http://schemas.microsoft.com/office/drawing/2010/main" w="9525">
                   <a:solidFill>
                     <a:srgbClr val="000000"/>
                   </a:solidFill>
@@ -1606,7 +1606,7 @@
             </a:ln>
             <a:extLst>
               <a:ext uri="{91240B29-F687-4f45-9708-019B960494DF}">
-                <a14:hiddenLine xmlns:a14="http://schemas.microsoft.com/office/drawing/2010/main" xmlns="" w="9525">
+                <a14:hiddenLine xmlns="" xmlns:a14="http://schemas.microsoft.com/office/drawing/2010/main" w="9525">
                   <a:solidFill>
                     <a:srgbClr val="000000"/>
                   </a:solidFill>
@@ -1716,7 +1716,7 @@
             </a:ln>
             <a:extLst>
               <a:ext uri="{91240B29-F687-4f45-9708-019B960494DF}">
-                <a14:hiddenLine xmlns:a14="http://schemas.microsoft.com/office/drawing/2010/main" xmlns="" w="9525">
+                <a14:hiddenLine xmlns="" xmlns:a14="http://schemas.microsoft.com/office/drawing/2010/main" w="9525">
                   <a:solidFill>
                     <a:srgbClr val="000000"/>
                   </a:solidFill>
@@ -1778,7 +1778,7 @@
             </a:ln>
             <a:extLst>
               <a:ext uri="{91240B29-F687-4f45-9708-019B960494DF}">
-                <a14:hiddenLine xmlns:a14="http://schemas.microsoft.com/office/drawing/2010/main" xmlns="" w="9525">
+                <a14:hiddenLine xmlns="" xmlns:a14="http://schemas.microsoft.com/office/drawing/2010/main" w="9525">
                   <a:solidFill>
                     <a:srgbClr val="000000"/>
                   </a:solidFill>
@@ -1868,7 +1868,7 @@
             </a:ln>
             <a:extLst>
               <a:ext uri="{91240B29-F687-4f45-9708-019B960494DF}">
-                <a14:hiddenLine xmlns:a14="http://schemas.microsoft.com/office/drawing/2010/main" xmlns="" w="9525">
+                <a14:hiddenLine xmlns="" xmlns:a14="http://schemas.microsoft.com/office/drawing/2010/main" w="9525">
                   <a:solidFill>
                     <a:srgbClr val="000000"/>
                   </a:solidFill>
@@ -1958,7 +1958,7 @@
             </a:ln>
             <a:extLst>
               <a:ext uri="{91240B29-F687-4f45-9708-019B960494DF}">
-                <a14:hiddenLine xmlns:a14="http://schemas.microsoft.com/office/drawing/2010/main" xmlns="" w="9525">
+                <a14:hiddenLine xmlns="" xmlns:a14="http://schemas.microsoft.com/office/drawing/2010/main" w="9525">
                   <a:solidFill>
                     <a:srgbClr val="000000"/>
                   </a:solidFill>
@@ -2020,7 +2020,7 @@
             </a:ln>
             <a:extLst>
               <a:ext uri="{91240B29-F687-4f45-9708-019B960494DF}">
-                <a14:hiddenLine xmlns:a14="http://schemas.microsoft.com/office/drawing/2010/main" xmlns="" w="9525">
+                <a14:hiddenLine xmlns="" xmlns:a14="http://schemas.microsoft.com/office/drawing/2010/main" w="9525">
                   <a:solidFill>
                     <a:srgbClr val="000000"/>
                   </a:solidFill>
@@ -2110,7 +2110,7 @@
             </a:ln>
             <a:extLst>
               <a:ext uri="{91240B29-F687-4f45-9708-019B960494DF}">
-                <a14:hiddenLine xmlns:a14="http://schemas.microsoft.com/office/drawing/2010/main" xmlns="" w="9525">
+                <a14:hiddenLine xmlns="" xmlns:a14="http://schemas.microsoft.com/office/drawing/2010/main" w="9525">
                   <a:solidFill>
                     <a:srgbClr val="000000"/>
                   </a:solidFill>
@@ -2200,7 +2200,7 @@
             </a:ln>
             <a:extLst>
               <a:ext uri="{91240B29-F687-4f45-9708-019B960494DF}">
-                <a14:hiddenLine xmlns:a14="http://schemas.microsoft.com/office/drawing/2010/main" xmlns="" w="9525">
+                <a14:hiddenLine xmlns="" xmlns:a14="http://schemas.microsoft.com/office/drawing/2010/main" w="9525">
                   <a:solidFill>
                     <a:srgbClr val="000000"/>
                   </a:solidFill>
@@ -2256,7 +2256,7 @@
             </a:ln>
             <a:extLst>
               <a:ext uri="{91240B29-F687-4f45-9708-019B960494DF}">
-                <a14:hiddenLine xmlns:a14="http://schemas.microsoft.com/office/drawing/2010/main" xmlns="" w="9525">
+                <a14:hiddenLine xmlns="" xmlns:a14="http://schemas.microsoft.com/office/drawing/2010/main" w="9525">
                   <a:solidFill>
                     <a:srgbClr val="000000"/>
                   </a:solidFill>
@@ -2346,7 +2346,7 @@
             </a:ln>
             <a:extLst>
               <a:ext uri="{91240B29-F687-4f45-9708-019B960494DF}">
-                <a14:hiddenLine xmlns:a14="http://schemas.microsoft.com/office/drawing/2010/main" xmlns="" w="9525">
+                <a14:hiddenLine xmlns="" xmlns:a14="http://schemas.microsoft.com/office/drawing/2010/main" w="9525">
                   <a:solidFill>
                     <a:srgbClr val="000000"/>
                   </a:solidFill>
@@ -2402,7 +2402,7 @@
             </a:ln>
             <a:extLst>
               <a:ext uri="{91240B29-F687-4f45-9708-019B960494DF}">
-                <a14:hiddenLine xmlns:a14="http://schemas.microsoft.com/office/drawing/2010/main" xmlns="" w="9525">
+                <a14:hiddenLine xmlns="" xmlns:a14="http://schemas.microsoft.com/office/drawing/2010/main" w="9525">
                   <a:solidFill>
                     <a:srgbClr val="000000"/>
                   </a:solidFill>
@@ -2492,7 +2492,7 @@
             </a:ln>
             <a:extLst>
               <a:ext uri="{91240B29-F687-4f45-9708-019B960494DF}">
-                <a14:hiddenLine xmlns:a14="http://schemas.microsoft.com/office/drawing/2010/main" xmlns="" w="9525">
+                <a14:hiddenLine xmlns="" xmlns:a14="http://schemas.microsoft.com/office/drawing/2010/main" w="9525">
                   <a:solidFill>
                     <a:srgbClr val="000000"/>
                   </a:solidFill>
@@ -2560,7 +2560,7 @@
             </a:ln>
             <a:extLst>
               <a:ext uri="{91240B29-F687-4f45-9708-019B960494DF}">
-                <a14:hiddenLine xmlns:a14="http://schemas.microsoft.com/office/drawing/2010/main" xmlns="" w="9525">
+                <a14:hiddenLine xmlns="" xmlns:a14="http://schemas.microsoft.com/office/drawing/2010/main" w="9525">
                   <a:solidFill>
                     <a:srgbClr val="000000"/>
                   </a:solidFill>
@@ -2650,7 +2650,7 @@
             </a:ln>
             <a:extLst>
               <a:ext uri="{91240B29-F687-4f45-9708-019B960494DF}">
-                <a14:hiddenLine xmlns:a14="http://schemas.microsoft.com/office/drawing/2010/main" xmlns="" w="9525">
+                <a14:hiddenLine xmlns="" xmlns:a14="http://schemas.microsoft.com/office/drawing/2010/main" w="9525">
                   <a:solidFill>
                     <a:srgbClr val="000000"/>
                   </a:solidFill>
@@ -2718,7 +2718,7 @@
             </a:ln>
             <a:extLst>
               <a:ext uri="{91240B29-F687-4f45-9708-019B960494DF}">
-                <a14:hiddenLine xmlns:a14="http://schemas.microsoft.com/office/drawing/2010/main" xmlns="" w="9525">
+                <a14:hiddenLine xmlns="" xmlns:a14="http://schemas.microsoft.com/office/drawing/2010/main" w="9525">
                   <a:solidFill>
                     <a:srgbClr val="000000"/>
                   </a:solidFill>
@@ -2808,7 +2808,7 @@
             </a:ln>
             <a:extLst>
               <a:ext uri="{91240B29-F687-4f45-9708-019B960494DF}">
-                <a14:hiddenLine xmlns:a14="http://schemas.microsoft.com/office/drawing/2010/main" xmlns="" w="9525">
+                <a14:hiddenLine xmlns="" xmlns:a14="http://schemas.microsoft.com/office/drawing/2010/main" w="9525">
                   <a:solidFill>
                     <a:srgbClr val="000000"/>
                   </a:solidFill>
@@ -2842,7 +2842,7 @@
             </a:ln>
             <a:extLst>
               <a:ext uri="{91240B29-F687-4f45-9708-019B960494DF}">
-                <a14:hiddenLine xmlns:a14="http://schemas.microsoft.com/office/drawing/2010/main" xmlns="" w="9525">
+                <a14:hiddenLine xmlns="" xmlns:a14="http://schemas.microsoft.com/office/drawing/2010/main" w="9525">
                   <a:solidFill>
                     <a:srgbClr val="000000"/>
                   </a:solidFill>
@@ -2932,7 +2932,7 @@
             </a:ln>
             <a:extLst>
               <a:ext uri="{91240B29-F687-4f45-9708-019B960494DF}">
-                <a14:hiddenLine xmlns:a14="http://schemas.microsoft.com/office/drawing/2010/main" xmlns="" w="9525">
+                <a14:hiddenLine xmlns="" xmlns:a14="http://schemas.microsoft.com/office/drawing/2010/main" w="9525">
                   <a:solidFill>
                     <a:srgbClr val="000000"/>
                   </a:solidFill>
@@ -2994,7 +2994,7 @@
             </a:ln>
             <a:extLst>
               <a:ext uri="{91240B29-F687-4f45-9708-019B960494DF}">
-                <a14:hiddenLine xmlns:a14="http://schemas.microsoft.com/office/drawing/2010/main" xmlns="" w="9525">
+                <a14:hiddenLine xmlns="" xmlns:a14="http://schemas.microsoft.com/office/drawing/2010/main" w="9525">
                   <a:solidFill>
                     <a:srgbClr val="000000"/>
                   </a:solidFill>
@@ -3056,7 +3056,7 @@
             </a:ln>
             <a:extLst>
               <a:ext uri="{91240B29-F687-4f45-9708-019B960494DF}">
-                <a14:hiddenLine xmlns:a14="http://schemas.microsoft.com/office/drawing/2010/main" xmlns="" w="9525">
+                <a14:hiddenLine xmlns="" xmlns:a14="http://schemas.microsoft.com/office/drawing/2010/main" w="9525">
                   <a:solidFill>
                     <a:srgbClr val="000000"/>
                   </a:solidFill>
@@ -3146,7 +3146,7 @@
             </a:ln>
             <a:extLst>
               <a:ext uri="{91240B29-F687-4f45-9708-019B960494DF}">
-                <a14:hiddenLine xmlns:a14="http://schemas.microsoft.com/office/drawing/2010/main" xmlns="" w="9525">
+                <a14:hiddenLine xmlns="" xmlns:a14="http://schemas.microsoft.com/office/drawing/2010/main" w="9525">
                   <a:solidFill>
                     <a:srgbClr val="000000"/>
                   </a:solidFill>
@@ -3214,7 +3214,7 @@
             </a:ln>
             <a:extLst>
               <a:ext uri="{91240B29-F687-4f45-9708-019B960494DF}">
-                <a14:hiddenLine xmlns:a14="http://schemas.microsoft.com/office/drawing/2010/main" xmlns="" w="9525">
+                <a14:hiddenLine xmlns="" xmlns:a14="http://schemas.microsoft.com/office/drawing/2010/main" w="9525">
                   <a:solidFill>
                     <a:srgbClr val="000000"/>
                   </a:solidFill>
@@ -3276,7 +3276,7 @@
             </a:ln>
             <a:extLst>
               <a:ext uri="{91240B29-F687-4f45-9708-019B960494DF}">
-                <a14:hiddenLine xmlns:a14="http://schemas.microsoft.com/office/drawing/2010/main" xmlns="" w="9525">
+                <a14:hiddenLine xmlns="" xmlns:a14="http://schemas.microsoft.com/office/drawing/2010/main" w="9525">
                   <a:solidFill>
                     <a:srgbClr val="000000"/>
                   </a:solidFill>
@@ -3366,7 +3366,7 @@
             </a:ln>
             <a:extLst>
               <a:ext uri="{91240B29-F687-4f45-9708-019B960494DF}">
-                <a14:hiddenLine xmlns:a14="http://schemas.microsoft.com/office/drawing/2010/main" xmlns="" w="9525">
+                <a14:hiddenLine xmlns="" xmlns:a14="http://schemas.microsoft.com/office/drawing/2010/main" w="9525">
                   <a:solidFill>
                     <a:srgbClr val="000000"/>
                   </a:solidFill>
@@ -3428,7 +3428,7 @@
             </a:ln>
             <a:extLst>
               <a:ext uri="{91240B29-F687-4f45-9708-019B960494DF}">
-                <a14:hiddenLine xmlns:a14="http://schemas.microsoft.com/office/drawing/2010/main" xmlns="" w="9525">
+                <a14:hiddenLine xmlns="" xmlns:a14="http://schemas.microsoft.com/office/drawing/2010/main" w="9525">
                   <a:solidFill>
                     <a:srgbClr val="000000"/>
                   </a:solidFill>
@@ -3518,7 +3518,7 @@
             </a:ln>
             <a:extLst>
               <a:ext uri="{91240B29-F687-4f45-9708-019B960494DF}">
-                <a14:hiddenLine xmlns:a14="http://schemas.microsoft.com/office/drawing/2010/main" xmlns="" w="9525">
+                <a14:hiddenLine xmlns="" xmlns:a14="http://schemas.microsoft.com/office/drawing/2010/main" w="9525">
                   <a:solidFill>
                     <a:srgbClr val="000000"/>
                   </a:solidFill>
@@ -3580,7 +3580,7 @@
             </a:ln>
             <a:extLst>
               <a:ext uri="{91240B29-F687-4f45-9708-019B960494DF}">
-                <a14:hiddenLine xmlns:a14="http://schemas.microsoft.com/office/drawing/2010/main" xmlns="" w="9525">
+                <a14:hiddenLine xmlns="" xmlns:a14="http://schemas.microsoft.com/office/drawing/2010/main" w="9525">
                   <a:solidFill>
                     <a:srgbClr val="000000"/>
                   </a:solidFill>
@@ -3670,7 +3670,7 @@
             </a:ln>
             <a:extLst>
               <a:ext uri="{91240B29-F687-4f45-9708-019B960494DF}">
-                <a14:hiddenLine xmlns:a14="http://schemas.microsoft.com/office/drawing/2010/main" xmlns="" w="9525">
+                <a14:hiddenLine xmlns="" xmlns:a14="http://schemas.microsoft.com/office/drawing/2010/main" w="9525">
                   <a:solidFill>
                     <a:srgbClr val="000000"/>
                   </a:solidFill>
@@ -3704,7 +3704,7 @@
             </a:ln>
             <a:extLst>
               <a:ext uri="{91240B29-F687-4f45-9708-019B960494DF}">
-                <a14:hiddenLine xmlns:a14="http://schemas.microsoft.com/office/drawing/2010/main" xmlns="" w="9525">
+                <a14:hiddenLine xmlns="" xmlns:a14="http://schemas.microsoft.com/office/drawing/2010/main" w="9525">
                   <a:solidFill>
                     <a:srgbClr val="000000"/>
                   </a:solidFill>
@@ -3769,7 +3769,7 @@
             </a:ln>
             <a:extLst>
               <a:ext uri="{91240B29-F687-4f45-9708-019B960494DF}">
-                <a14:hiddenLine xmlns:a14="http://schemas.microsoft.com/office/drawing/2010/main" xmlns="" w="9525">
+                <a14:hiddenLine xmlns="" xmlns:a14="http://schemas.microsoft.com/office/drawing/2010/main" w="9525">
                   <a:solidFill>
                     <a:srgbClr val="000000"/>
                   </a:solidFill>
@@ -3859,7 +3859,7 @@
             </a:ln>
             <a:extLst>
               <a:ext uri="{91240B29-F687-4f45-9708-019B960494DF}">
-                <a14:hiddenLine xmlns:a14="http://schemas.microsoft.com/office/drawing/2010/main" xmlns="" w="9525">
+                <a14:hiddenLine xmlns="" xmlns:a14="http://schemas.microsoft.com/office/drawing/2010/main" w="9525">
                   <a:solidFill>
                     <a:srgbClr val="000000"/>
                   </a:solidFill>
@@ -3921,7 +3921,7 @@
             </a:ln>
             <a:extLst>
               <a:ext uri="{91240B29-F687-4f45-9708-019B960494DF}">
-                <a14:hiddenLine xmlns:a14="http://schemas.microsoft.com/office/drawing/2010/main" xmlns="" w="9525">
+                <a14:hiddenLine xmlns="" xmlns:a14="http://schemas.microsoft.com/office/drawing/2010/main" w="9525">
                   <a:solidFill>
                     <a:srgbClr val="000000"/>
                   </a:solidFill>
@@ -4011,7 +4011,7 @@
             </a:ln>
             <a:extLst>
               <a:ext uri="{91240B29-F687-4f45-9708-019B960494DF}">
-                <a14:hiddenLine xmlns:a14="http://schemas.microsoft.com/office/drawing/2010/main" xmlns="" w="9525">
+                <a14:hiddenLine xmlns="" xmlns:a14="http://schemas.microsoft.com/office/drawing/2010/main" w="9525">
                   <a:solidFill>
                     <a:srgbClr val="000000"/>
                   </a:solidFill>
@@ -4101,7 +4101,7 @@
             </a:ln>
             <a:extLst>
               <a:ext uri="{91240B29-F687-4f45-9708-019B960494DF}">
-                <a14:hiddenLine xmlns:a14="http://schemas.microsoft.com/office/drawing/2010/main" xmlns="" w="9525">
+                <a14:hiddenLine xmlns="" xmlns:a14="http://schemas.microsoft.com/office/drawing/2010/main" w="9525">
                   <a:solidFill>
                     <a:srgbClr val="000000"/>
                   </a:solidFill>
@@ -4166,7 +4166,7 @@
             </a:ln>
             <a:extLst>
               <a:ext uri="{91240B29-F687-4f45-9708-019B960494DF}">
-                <a14:hiddenLine xmlns:a14="http://schemas.microsoft.com/office/drawing/2010/main" xmlns="" w="9525">
+                <a14:hiddenLine xmlns="" xmlns:a14="http://schemas.microsoft.com/office/drawing/2010/main" w="9525">
                   <a:solidFill>
                     <a:srgbClr val="000000"/>
                   </a:solidFill>
@@ -4228,7 +4228,7 @@
             </a:ln>
             <a:extLst>
               <a:ext uri="{91240B29-F687-4f45-9708-019B960494DF}">
-                <a14:hiddenLine xmlns:a14="http://schemas.microsoft.com/office/drawing/2010/main" xmlns="" w="9525">
+                <a14:hiddenLine xmlns="" xmlns:a14="http://schemas.microsoft.com/office/drawing/2010/main" w="9525">
                   <a:solidFill>
                     <a:srgbClr val="000000"/>
                   </a:solidFill>
@@ -4318,7 +4318,7 @@
             </a:ln>
             <a:extLst>
               <a:ext uri="{91240B29-F687-4f45-9708-019B960494DF}">
-                <a14:hiddenLine xmlns:a14="http://schemas.microsoft.com/office/drawing/2010/main" xmlns="" w="9525">
+                <a14:hiddenLine xmlns="" xmlns:a14="http://schemas.microsoft.com/office/drawing/2010/main" w="9525">
                   <a:solidFill>
                     <a:srgbClr val="000000"/>
                   </a:solidFill>
@@ -4408,7 +4408,7 @@
             </a:ln>
             <a:extLst>
               <a:ext uri="{91240B29-F687-4f45-9708-019B960494DF}">
-                <a14:hiddenLine xmlns:a14="http://schemas.microsoft.com/office/drawing/2010/main" xmlns="" w="9525">
+                <a14:hiddenLine xmlns="" xmlns:a14="http://schemas.microsoft.com/office/drawing/2010/main" w="9525">
                   <a:solidFill>
                     <a:srgbClr val="000000"/>
                   </a:solidFill>
@@ -4470,7 +4470,7 @@
             </a:ln>
             <a:extLst>
               <a:ext uri="{91240B29-F687-4f45-9708-019B960494DF}">
-                <a14:hiddenLine xmlns:a14="http://schemas.microsoft.com/office/drawing/2010/main" xmlns="" w="9525">
+                <a14:hiddenLine xmlns="" xmlns:a14="http://schemas.microsoft.com/office/drawing/2010/main" w="9525">
                   <a:solidFill>
                     <a:srgbClr val="000000"/>
                   </a:solidFill>
@@ -4590,7 +4590,7 @@
             </a:ln>
             <a:extLst>
               <a:ext uri="{91240B29-F687-4f45-9708-019B960494DF}">
-                <a14:hiddenLine xmlns:a14="http://schemas.microsoft.com/office/drawing/2010/main" xmlns="" w="9525">
+                <a14:hiddenLine xmlns="" xmlns:a14="http://schemas.microsoft.com/office/drawing/2010/main" w="9525">
                   <a:solidFill>
                     <a:srgbClr val="000000"/>
                   </a:solidFill>
@@ -4658,7 +4658,7 @@
             </a:ln>
             <a:extLst>
               <a:ext uri="{91240B29-F687-4f45-9708-019B960494DF}">
-                <a14:hiddenLine xmlns:a14="http://schemas.microsoft.com/office/drawing/2010/main" xmlns="" w="9525">
+                <a14:hiddenLine xmlns="" xmlns:a14="http://schemas.microsoft.com/office/drawing/2010/main" w="9525">
                   <a:solidFill>
                     <a:srgbClr val="000000"/>
                   </a:solidFill>
@@ -4748,7 +4748,7 @@
             </a:ln>
             <a:extLst>
               <a:ext uri="{91240B29-F687-4f45-9708-019B960494DF}">
-                <a14:hiddenLine xmlns:a14="http://schemas.microsoft.com/office/drawing/2010/main" xmlns="" w="9525">
+                <a14:hiddenLine xmlns="" xmlns:a14="http://schemas.microsoft.com/office/drawing/2010/main" w="9525">
                   <a:solidFill>
                     <a:srgbClr val="000000"/>
                   </a:solidFill>
@@ -4888,7 +4888,7 @@
           <a:p>
             <a:fld id="{F34B6E3E-06F4-4326-ABDB-61EE022A2F5F}" type="datetimeFigureOut">
               <a:rPr lang="en-US" smtClean="0"/>
-              <a:t>8/27/2020</a:t>
+              <a:t>8/31/2020</a:t>
             </a:fld>
             <a:endParaRPr lang="en-US"/>
           </a:p>
@@ -5155,7 +5155,7 @@
           <a:p>
             <a:fld id="{F34B6E3E-06F4-4326-ABDB-61EE022A2F5F}" type="datetimeFigureOut">
               <a:rPr lang="en-US" smtClean="0"/>
-              <a:t>8/27/2020</a:t>
+              <a:t>8/31/2020</a:t>
             </a:fld>
             <a:endParaRPr lang="en-US"/>
           </a:p>
@@ -5351,7 +5351,7 @@
           <a:p>
             <a:fld id="{F34B6E3E-06F4-4326-ABDB-61EE022A2F5F}" type="datetimeFigureOut">
               <a:rPr lang="en-US" smtClean="0"/>
-              <a:t>8/27/2020</a:t>
+              <a:t>8/31/2020</a:t>
             </a:fld>
             <a:endParaRPr lang="en-US"/>
           </a:p>
@@ -5614,7 +5614,7 @@
           <a:p>
             <a:fld id="{F34B6E3E-06F4-4326-ABDB-61EE022A2F5F}" type="datetimeFigureOut">
               <a:rPr lang="en-US" smtClean="0"/>
-              <a:t>8/27/2020</a:t>
+              <a:t>8/31/2020</a:t>
             </a:fld>
             <a:endParaRPr lang="en-US"/>
           </a:p>
@@ -6048,7 +6048,7 @@
           <a:p>
             <a:fld id="{F34B6E3E-06F4-4326-ABDB-61EE022A2F5F}" type="datetimeFigureOut">
               <a:rPr lang="en-US" smtClean="0"/>
-              <a:t>8/27/2020</a:t>
+              <a:t>8/31/2020</a:t>
             </a:fld>
             <a:endParaRPr lang="en-US"/>
           </a:p>
@@ -6594,7 +6594,7 @@
           <a:p>
             <a:fld id="{F34B6E3E-06F4-4326-ABDB-61EE022A2F5F}" type="datetimeFigureOut">
               <a:rPr lang="en-US" smtClean="0"/>
-              <a:t>8/27/2020</a:t>
+              <a:t>8/31/2020</a:t>
             </a:fld>
             <a:endParaRPr lang="en-US"/>
           </a:p>
@@ -7314,7 +7314,7 @@
           <a:p>
             <a:fld id="{F34B6E3E-06F4-4326-ABDB-61EE022A2F5F}" type="datetimeFigureOut">
               <a:rPr lang="en-US" smtClean="0"/>
-              <a:t>8/27/2020</a:t>
+              <a:t>8/31/2020</a:t>
             </a:fld>
             <a:endParaRPr lang="en-US"/>
           </a:p>
@@ -7484,7 +7484,7 @@
           <a:p>
             <a:fld id="{F34B6E3E-06F4-4326-ABDB-61EE022A2F5F}" type="datetimeFigureOut">
               <a:rPr lang="en-US" smtClean="0"/>
-              <a:t>8/27/2020</a:t>
+              <a:t>8/31/2020</a:t>
             </a:fld>
             <a:endParaRPr lang="en-US"/>
           </a:p>
@@ -7664,7 +7664,7 @@
           <a:p>
             <a:fld id="{F34B6E3E-06F4-4326-ABDB-61EE022A2F5F}" type="datetimeFigureOut">
               <a:rPr lang="en-US" smtClean="0"/>
-              <a:t>8/27/2020</a:t>
+              <a:t>8/31/2020</a:t>
             </a:fld>
             <a:endParaRPr lang="en-US"/>
           </a:p>
@@ -8332,7 +8332,7 @@
           <a:p>
             <a:fld id="{F34B6E3E-06F4-4326-ABDB-61EE022A2F5F}" type="datetimeFigureOut">
               <a:rPr lang="en-US" smtClean="0"/>
-              <a:t>8/27/2020</a:t>
+              <a:t>8/31/2020</a:t>
             </a:fld>
             <a:endParaRPr lang="en-US"/>
           </a:p>
@@ -8582,7 +8582,7 @@
           <a:p>
             <a:fld id="{F34B6E3E-06F4-4326-ABDB-61EE022A2F5F}" type="datetimeFigureOut">
               <a:rPr lang="en-US" smtClean="0"/>
-              <a:t>8/27/2020</a:t>
+              <a:t>8/31/2020</a:t>
             </a:fld>
             <a:endParaRPr lang="en-US"/>
           </a:p>
@@ -8814,7 +8814,7 @@
           <a:p>
             <a:fld id="{F34B6E3E-06F4-4326-ABDB-61EE022A2F5F}" type="datetimeFigureOut">
               <a:rPr lang="en-US" smtClean="0"/>
-              <a:t>8/27/2020</a:t>
+              <a:t>8/31/2020</a:t>
             </a:fld>
             <a:endParaRPr lang="en-US"/>
           </a:p>
@@ -9195,7 +9195,7 @@
           <a:p>
             <a:fld id="{F34B6E3E-06F4-4326-ABDB-61EE022A2F5F}" type="datetimeFigureOut">
               <a:rPr lang="en-US" smtClean="0"/>
-              <a:t>8/27/2020</a:t>
+              <a:t>8/31/2020</a:t>
             </a:fld>
             <a:endParaRPr lang="en-US"/>
           </a:p>
@@ -9313,7 +9313,7 @@
           <a:p>
             <a:fld id="{F34B6E3E-06F4-4326-ABDB-61EE022A2F5F}" type="datetimeFigureOut">
               <a:rPr lang="en-US" smtClean="0"/>
-              <a:t>8/27/2020</a:t>
+              <a:t>8/31/2020</a:t>
             </a:fld>
             <a:endParaRPr lang="en-US"/>
           </a:p>
@@ -9408,7 +9408,7 @@
           <a:p>
             <a:fld id="{F34B6E3E-06F4-4326-ABDB-61EE022A2F5F}" type="datetimeFigureOut">
               <a:rPr lang="en-US" smtClean="0"/>
-              <a:t>8/27/2020</a:t>
+              <a:t>8/31/2020</a:t>
             </a:fld>
             <a:endParaRPr lang="en-US"/>
           </a:p>
@@ -9657,7 +9657,7 @@
           <a:p>
             <a:fld id="{F34B6E3E-06F4-4326-ABDB-61EE022A2F5F}" type="datetimeFigureOut">
               <a:rPr lang="en-US" smtClean="0"/>
-              <a:t>8/27/2020</a:t>
+              <a:t>8/31/2020</a:t>
             </a:fld>
             <a:endParaRPr lang="en-US"/>
           </a:p>
@@ -9937,7 +9937,7 @@
           <a:p>
             <a:fld id="{F34B6E3E-06F4-4326-ABDB-61EE022A2F5F}" type="datetimeFigureOut">
               <a:rPr lang="en-US" smtClean="0"/>
-              <a:t>8/27/2020</a:t>
+              <a:t>8/31/2020</a:t>
             </a:fld>
             <a:endParaRPr lang="en-US"/>
           </a:p>
@@ -10053,7 +10053,7 @@
           <a:noFill/>
           <a:extLst>
             <a:ext uri="{909E8E84-426E-40dd-AFC4-6F175D3DCCD1}">
-              <a14:hiddenFill xmlns:a14="http://schemas.microsoft.com/office/drawing/2010/main" xmlns="">
+              <a14:hiddenFill xmlns="" xmlns:a14="http://schemas.microsoft.com/office/drawing/2010/main">
                 <a:solidFill>
                   <a:srgbClr val="FFFFFF"/>
                 </a:solidFill>
@@ -10127,7 +10127,7 @@
               </a:ln>
               <a:extLst>
                 <a:ext uri="{91240B29-F687-4f45-9708-019B960494DF}">
-                  <a14:hiddenLine xmlns:a14="http://schemas.microsoft.com/office/drawing/2010/main" xmlns="" w="9525">
+                  <a14:hiddenLine xmlns="" xmlns:a14="http://schemas.microsoft.com/office/drawing/2010/main" w="9525">
                     <a:solidFill>
                       <a:srgbClr val="000000"/>
                     </a:solidFill>
@@ -10217,7 +10217,7 @@
               </a:ln>
               <a:extLst>
                 <a:ext uri="{91240B29-F687-4f45-9708-019B960494DF}">
-                  <a14:hiddenLine xmlns:a14="http://schemas.microsoft.com/office/drawing/2010/main" xmlns="" w="9525">
+                  <a14:hiddenLine xmlns="" xmlns:a14="http://schemas.microsoft.com/office/drawing/2010/main" w="9525">
                     <a:solidFill>
                       <a:srgbClr val="000000"/>
                     </a:solidFill>
@@ -10307,7 +10307,7 @@
               </a:ln>
               <a:extLst>
                 <a:ext uri="{91240B29-F687-4f45-9708-019B960494DF}">
-                  <a14:hiddenLine xmlns:a14="http://schemas.microsoft.com/office/drawing/2010/main" xmlns="" w="9525">
+                  <a14:hiddenLine xmlns="" xmlns:a14="http://schemas.microsoft.com/office/drawing/2010/main" w="9525">
                     <a:solidFill>
                       <a:srgbClr val="000000"/>
                     </a:solidFill>
@@ -10369,7 +10369,7 @@
               </a:ln>
               <a:extLst>
                 <a:ext uri="{91240B29-F687-4f45-9708-019B960494DF}">
-                  <a14:hiddenLine xmlns:a14="http://schemas.microsoft.com/office/drawing/2010/main" xmlns="" w="9525">
+                  <a14:hiddenLine xmlns="" xmlns:a14="http://schemas.microsoft.com/office/drawing/2010/main" w="9525">
                     <a:solidFill>
                       <a:srgbClr val="000000"/>
                     </a:solidFill>
@@ -10459,7 +10459,7 @@
               </a:ln>
               <a:extLst>
                 <a:ext uri="{91240B29-F687-4f45-9708-019B960494DF}">
-                  <a14:hiddenLine xmlns:a14="http://schemas.microsoft.com/office/drawing/2010/main" xmlns="" w="9525">
+                  <a14:hiddenLine xmlns="" xmlns:a14="http://schemas.microsoft.com/office/drawing/2010/main" w="9525">
                     <a:solidFill>
                       <a:srgbClr val="000000"/>
                     </a:solidFill>
@@ -10521,7 +10521,7 @@
               </a:ln>
               <a:extLst>
                 <a:ext uri="{91240B29-F687-4f45-9708-019B960494DF}">
-                  <a14:hiddenLine xmlns:a14="http://schemas.microsoft.com/office/drawing/2010/main" xmlns="" w="9525">
+                  <a14:hiddenLine xmlns="" xmlns:a14="http://schemas.microsoft.com/office/drawing/2010/main" w="9525">
                     <a:solidFill>
                       <a:srgbClr val="000000"/>
                     </a:solidFill>
@@ -10583,7 +10583,7 @@
               </a:ln>
               <a:extLst>
                 <a:ext uri="{91240B29-F687-4f45-9708-019B960494DF}">
-                  <a14:hiddenLine xmlns:a14="http://schemas.microsoft.com/office/drawing/2010/main" xmlns="" w="9525">
+                  <a14:hiddenLine xmlns="" xmlns:a14="http://schemas.microsoft.com/office/drawing/2010/main" w="9525">
                     <a:solidFill>
                       <a:srgbClr val="000000"/>
                     </a:solidFill>
@@ -10673,7 +10673,7 @@
               </a:ln>
               <a:extLst>
                 <a:ext uri="{91240B29-F687-4f45-9708-019B960494DF}">
-                  <a14:hiddenLine xmlns:a14="http://schemas.microsoft.com/office/drawing/2010/main" xmlns="" w="9525">
+                  <a14:hiddenLine xmlns="" xmlns:a14="http://schemas.microsoft.com/office/drawing/2010/main" w="9525">
                     <a:solidFill>
                       <a:srgbClr val="000000"/>
                     </a:solidFill>
@@ -10763,7 +10763,7 @@
               </a:ln>
               <a:extLst>
                 <a:ext uri="{91240B29-F687-4f45-9708-019B960494DF}">
-                  <a14:hiddenLine xmlns:a14="http://schemas.microsoft.com/office/drawing/2010/main" xmlns="" w="9525">
+                  <a14:hiddenLine xmlns="" xmlns:a14="http://schemas.microsoft.com/office/drawing/2010/main" w="9525">
                     <a:solidFill>
                       <a:srgbClr val="000000"/>
                     </a:solidFill>
@@ -10825,7 +10825,7 @@
               </a:ln>
               <a:extLst>
                 <a:ext uri="{91240B29-F687-4f45-9708-019B960494DF}">
-                  <a14:hiddenLine xmlns:a14="http://schemas.microsoft.com/office/drawing/2010/main" xmlns="" w="9525">
+                  <a14:hiddenLine xmlns="" xmlns:a14="http://schemas.microsoft.com/office/drawing/2010/main" w="9525">
                     <a:solidFill>
                       <a:srgbClr val="000000"/>
                     </a:solidFill>
@@ -10935,7 +10935,7 @@
               </a:ln>
               <a:extLst>
                 <a:ext uri="{91240B29-F687-4f45-9708-019B960494DF}">
-                  <a14:hiddenLine xmlns:a14="http://schemas.microsoft.com/office/drawing/2010/main" xmlns="" w="9525">
+                  <a14:hiddenLine xmlns="" xmlns:a14="http://schemas.microsoft.com/office/drawing/2010/main" w="9525">
                     <a:solidFill>
                       <a:srgbClr val="000000"/>
                     </a:solidFill>
@@ -11019,7 +11019,7 @@
               </a:ln>
               <a:extLst>
                 <a:ext uri="{91240B29-F687-4f45-9708-019B960494DF}">
-                  <a14:hiddenLine xmlns:a14="http://schemas.microsoft.com/office/drawing/2010/main" xmlns="" w="9525">
+                  <a14:hiddenLine xmlns="" xmlns:a14="http://schemas.microsoft.com/office/drawing/2010/main" w="9525">
                     <a:solidFill>
                       <a:srgbClr val="000000"/>
                     </a:solidFill>
@@ -11081,7 +11081,7 @@
               </a:ln>
               <a:extLst>
                 <a:ext uri="{91240B29-F687-4f45-9708-019B960494DF}">
-                  <a14:hiddenLine xmlns:a14="http://schemas.microsoft.com/office/drawing/2010/main" xmlns="" w="9525">
+                  <a14:hiddenLine xmlns="" xmlns:a14="http://schemas.microsoft.com/office/drawing/2010/main" w="9525">
                     <a:solidFill>
                       <a:srgbClr val="000000"/>
                     </a:solidFill>
@@ -11143,7 +11143,7 @@
               </a:ln>
               <a:extLst>
                 <a:ext uri="{91240B29-F687-4f45-9708-019B960494DF}">
-                  <a14:hiddenLine xmlns:a14="http://schemas.microsoft.com/office/drawing/2010/main" xmlns="" w="9525">
+                  <a14:hiddenLine xmlns="" xmlns:a14="http://schemas.microsoft.com/office/drawing/2010/main" w="9525">
                     <a:solidFill>
                       <a:srgbClr val="000000"/>
                     </a:solidFill>
@@ -11233,7 +11233,7 @@
               </a:ln>
               <a:extLst>
                 <a:ext uri="{91240B29-F687-4f45-9708-019B960494DF}">
-                  <a14:hiddenLine xmlns:a14="http://schemas.microsoft.com/office/drawing/2010/main" xmlns="" w="9525">
+                  <a14:hiddenLine xmlns="" xmlns:a14="http://schemas.microsoft.com/office/drawing/2010/main" w="9525">
                     <a:solidFill>
                       <a:srgbClr val="000000"/>
                     </a:solidFill>
@@ -11267,7 +11267,7 @@
               </a:ln>
               <a:extLst>
                 <a:ext uri="{91240B29-F687-4f45-9708-019B960494DF}">
-                  <a14:hiddenLine xmlns:a14="http://schemas.microsoft.com/office/drawing/2010/main" xmlns="" w="9525">
+                  <a14:hiddenLine xmlns="" xmlns:a14="http://schemas.microsoft.com/office/drawing/2010/main" w="9525">
                     <a:solidFill>
                       <a:srgbClr val="000000"/>
                     </a:solidFill>
@@ -11332,7 +11332,7 @@
               </a:ln>
               <a:extLst>
                 <a:ext uri="{91240B29-F687-4f45-9708-019B960494DF}">
-                  <a14:hiddenLine xmlns:a14="http://schemas.microsoft.com/office/drawing/2010/main" xmlns="" w="9525">
+                  <a14:hiddenLine xmlns="" xmlns:a14="http://schemas.microsoft.com/office/drawing/2010/main" w="9525">
                     <a:solidFill>
                       <a:srgbClr val="000000"/>
                     </a:solidFill>
@@ -11422,7 +11422,7 @@
               </a:ln>
               <a:extLst>
                 <a:ext uri="{91240B29-F687-4f45-9708-019B960494DF}">
-                  <a14:hiddenLine xmlns:a14="http://schemas.microsoft.com/office/drawing/2010/main" xmlns="" w="9525">
+                  <a14:hiddenLine xmlns="" xmlns:a14="http://schemas.microsoft.com/office/drawing/2010/main" w="9525">
                     <a:solidFill>
                       <a:srgbClr val="000000"/>
                     </a:solidFill>
@@ -11484,7 +11484,7 @@
               </a:ln>
               <a:extLst>
                 <a:ext uri="{91240B29-F687-4f45-9708-019B960494DF}">
-                  <a14:hiddenLine xmlns:a14="http://schemas.microsoft.com/office/drawing/2010/main" xmlns="" w="9525">
+                  <a14:hiddenLine xmlns="" xmlns:a14="http://schemas.microsoft.com/office/drawing/2010/main" w="9525">
                     <a:solidFill>
                       <a:srgbClr val="000000"/>
                     </a:solidFill>
@@ -11574,7 +11574,7 @@
               </a:ln>
               <a:extLst>
                 <a:ext uri="{91240B29-F687-4f45-9708-019B960494DF}">
-                  <a14:hiddenLine xmlns:a14="http://schemas.microsoft.com/office/drawing/2010/main" xmlns="" w="9525">
+                  <a14:hiddenLine xmlns="" xmlns:a14="http://schemas.microsoft.com/office/drawing/2010/main" w="9525">
                     <a:solidFill>
                       <a:srgbClr val="000000"/>
                     </a:solidFill>
@@ -11639,7 +11639,7 @@
               </a:ln>
               <a:extLst>
                 <a:ext uri="{91240B29-F687-4f45-9708-019B960494DF}">
-                  <a14:hiddenLine xmlns:a14="http://schemas.microsoft.com/office/drawing/2010/main" xmlns="" w="9525">
+                  <a14:hiddenLine xmlns="" xmlns:a14="http://schemas.microsoft.com/office/drawing/2010/main" w="9525">
                     <a:solidFill>
                       <a:srgbClr val="000000"/>
                     </a:solidFill>
@@ -11701,7 +11701,7 @@
               </a:ln>
               <a:extLst>
                 <a:ext uri="{91240B29-F687-4f45-9708-019B960494DF}">
-                  <a14:hiddenLine xmlns:a14="http://schemas.microsoft.com/office/drawing/2010/main" xmlns="" w="9525">
+                  <a14:hiddenLine xmlns="" xmlns:a14="http://schemas.microsoft.com/office/drawing/2010/main" w="9525">
                     <a:solidFill>
                       <a:srgbClr val="000000"/>
                     </a:solidFill>
@@ -11791,7 +11791,7 @@
               </a:ln>
               <a:extLst>
                 <a:ext uri="{91240B29-F687-4f45-9708-019B960494DF}">
-                  <a14:hiddenLine xmlns:a14="http://schemas.microsoft.com/office/drawing/2010/main" xmlns="" w="9525">
+                  <a14:hiddenLine xmlns="" xmlns:a14="http://schemas.microsoft.com/office/drawing/2010/main" w="9525">
                     <a:solidFill>
                       <a:srgbClr val="000000"/>
                     </a:solidFill>
@@ -11881,7 +11881,7 @@
               </a:ln>
               <a:extLst>
                 <a:ext uri="{91240B29-F687-4f45-9708-019B960494DF}">
-                  <a14:hiddenLine xmlns:a14="http://schemas.microsoft.com/office/drawing/2010/main" xmlns="" w="9525">
+                  <a14:hiddenLine xmlns="" xmlns:a14="http://schemas.microsoft.com/office/drawing/2010/main" w="9525">
                     <a:solidFill>
                       <a:srgbClr val="000000"/>
                     </a:solidFill>
@@ -11946,7 +11946,7 @@
               </a:ln>
               <a:extLst>
                 <a:ext uri="{91240B29-F687-4f45-9708-019B960494DF}">
-                  <a14:hiddenLine xmlns:a14="http://schemas.microsoft.com/office/drawing/2010/main" xmlns="" w="9525">
+                  <a14:hiddenLine xmlns="" xmlns:a14="http://schemas.microsoft.com/office/drawing/2010/main" w="9525">
                     <a:solidFill>
                       <a:srgbClr val="000000"/>
                     </a:solidFill>
@@ -12066,7 +12066,7 @@
               </a:ln>
               <a:extLst>
                 <a:ext uri="{91240B29-F687-4f45-9708-019B960494DF}">
-                  <a14:hiddenLine xmlns:a14="http://schemas.microsoft.com/office/drawing/2010/main" xmlns="" w="9525">
+                  <a14:hiddenLine xmlns="" xmlns:a14="http://schemas.microsoft.com/office/drawing/2010/main" w="9525">
                     <a:solidFill>
                       <a:srgbClr val="000000"/>
                     </a:solidFill>
@@ -12164,7 +12164,7 @@
               </a:ln>
               <a:extLst>
                 <a:ext uri="{91240B29-F687-4f45-9708-019B960494DF}">
-                  <a14:hiddenLine xmlns:a14="http://schemas.microsoft.com/office/drawing/2010/main" xmlns="" w="9525">
+                  <a14:hiddenLine xmlns="" xmlns:a14="http://schemas.microsoft.com/office/drawing/2010/main" w="9525">
                     <a:solidFill>
                       <a:srgbClr val="000000"/>
                     </a:solidFill>
@@ -12279,7 +12279,7 @@
               </a:ln>
               <a:extLst>
                 <a:ext uri="{91240B29-F687-4f45-9708-019B960494DF}">
-                  <a14:hiddenLine xmlns:a14="http://schemas.microsoft.com/office/drawing/2010/main" xmlns="" w="9525">
+                  <a14:hiddenLine xmlns="" xmlns:a14="http://schemas.microsoft.com/office/drawing/2010/main" w="9525">
                     <a:solidFill>
                       <a:srgbClr val="000000"/>
                     </a:solidFill>
@@ -12369,7 +12369,7 @@
               </a:ln>
               <a:extLst>
                 <a:ext uri="{91240B29-F687-4f45-9708-019B960494DF}">
-                  <a14:hiddenLine xmlns:a14="http://schemas.microsoft.com/office/drawing/2010/main" xmlns="" w="9525">
+                  <a14:hiddenLine xmlns="" xmlns:a14="http://schemas.microsoft.com/office/drawing/2010/main" w="9525">
                     <a:solidFill>
                       <a:srgbClr val="000000"/>
                     </a:solidFill>
@@ -12434,7 +12434,7 @@
               </a:ln>
               <a:extLst>
                 <a:ext uri="{91240B29-F687-4f45-9708-019B960494DF}">
-                  <a14:hiddenLine xmlns:a14="http://schemas.microsoft.com/office/drawing/2010/main" xmlns="" w="9525">
+                  <a14:hiddenLine xmlns="" xmlns:a14="http://schemas.microsoft.com/office/drawing/2010/main" w="9525">
                     <a:solidFill>
                       <a:srgbClr val="000000"/>
                     </a:solidFill>
@@ -12524,7 +12524,7 @@
               </a:ln>
               <a:extLst>
                 <a:ext uri="{91240B29-F687-4f45-9708-019B960494DF}">
-                  <a14:hiddenLine xmlns:a14="http://schemas.microsoft.com/office/drawing/2010/main" xmlns="" w="9525">
+                  <a14:hiddenLine xmlns="" xmlns:a14="http://schemas.microsoft.com/office/drawing/2010/main" w="9525">
                     <a:solidFill>
                       <a:srgbClr val="000000"/>
                     </a:solidFill>
@@ -12592,7 +12592,7 @@
               </a:ln>
               <a:extLst>
                 <a:ext uri="{91240B29-F687-4f45-9708-019B960494DF}">
-                  <a14:hiddenLine xmlns:a14="http://schemas.microsoft.com/office/drawing/2010/main" xmlns="" w="9525">
+                  <a14:hiddenLine xmlns="" xmlns:a14="http://schemas.microsoft.com/office/drawing/2010/main" w="9525">
                     <a:solidFill>
                       <a:srgbClr val="000000"/>
                     </a:solidFill>
@@ -12682,7 +12682,7 @@
               </a:ln>
               <a:extLst>
                 <a:ext uri="{91240B29-F687-4f45-9708-019B960494DF}">
-                  <a14:hiddenLine xmlns:a14="http://schemas.microsoft.com/office/drawing/2010/main" xmlns="" w="9525">
+                  <a14:hiddenLine xmlns="" xmlns:a14="http://schemas.microsoft.com/office/drawing/2010/main" w="9525">
                     <a:solidFill>
                       <a:srgbClr val="000000"/>
                     </a:solidFill>
@@ -12750,7 +12750,7 @@
               </a:ln>
               <a:extLst>
                 <a:ext uri="{91240B29-F687-4f45-9708-019B960494DF}">
-                  <a14:hiddenLine xmlns:a14="http://schemas.microsoft.com/office/drawing/2010/main" xmlns="" w="9525">
+                  <a14:hiddenLine xmlns="" xmlns:a14="http://schemas.microsoft.com/office/drawing/2010/main" w="9525">
                     <a:solidFill>
                       <a:srgbClr val="000000"/>
                     </a:solidFill>
@@ -12840,7 +12840,7 @@
               </a:ln>
               <a:extLst>
                 <a:ext uri="{91240B29-F687-4f45-9708-019B960494DF}">
-                  <a14:hiddenLine xmlns:a14="http://schemas.microsoft.com/office/drawing/2010/main" xmlns="" w="9525">
+                  <a14:hiddenLine xmlns="" xmlns:a14="http://schemas.microsoft.com/office/drawing/2010/main" w="9525">
                     <a:solidFill>
                       <a:srgbClr val="000000"/>
                     </a:solidFill>
@@ -12874,7 +12874,7 @@
               </a:ln>
               <a:extLst>
                 <a:ext uri="{91240B29-F687-4f45-9708-019B960494DF}">
-                  <a14:hiddenLine xmlns:a14="http://schemas.microsoft.com/office/drawing/2010/main" xmlns="" w="9525">
+                  <a14:hiddenLine xmlns="" xmlns:a14="http://schemas.microsoft.com/office/drawing/2010/main" w="9525">
                     <a:solidFill>
                       <a:srgbClr val="000000"/>
                     </a:solidFill>
@@ -13014,7 +13014,7 @@
           <a:p>
             <a:fld id="{F34B6E3E-06F4-4326-ABDB-61EE022A2F5F}" type="datetimeFigureOut">
               <a:rPr lang="en-US" smtClean="0"/>
-              <a:t>8/27/2020</a:t>
+              <a:t>8/31/2020</a:t>
             </a:fld>
             <a:endParaRPr lang="en-US"/>
           </a:p>
@@ -14688,10 +14688,9 @@
               </a:lnSpc>
             </a:pPr>
             <a:r>
-              <a:rPr lang="en-US" sz="2800"/>
+              <a:rPr lang="en-US" sz="2800" dirty="0"/>
               <a:t>Index Performance</a:t>
             </a:r>
-            <a:endParaRPr lang="en-US" sz="2800" dirty="0"/>
           </a:p>
         </p:txBody>
       </p:sp>
@@ -16139,7 +16138,7 @@
           <a:p>
             <a:r>
               <a:rPr lang="en-US" sz="1800" dirty="0"/>
-              <a:t>WHERE </a:t>
+              <a:t>ORDER BY </a:t>
             </a:r>
             <a:r>
               <a:rPr lang="en-US" sz="1800" dirty="0" err="1"/>

</xml_diff>